<commit_message>
frame04 camera is ok
</commit_message>
<xml_diff>
--- a/pic.pptx
+++ b/pic.pptx
@@ -8,10 +8,11 @@
     <p:notesMasterId r:id="rId4"/>
   </p:notesMasterIdLst>
   <p:handoutMasterIdLst>
-    <p:handoutMasterId r:id="rId5"/>
+    <p:handoutMasterId r:id="rId6"/>
   </p:handoutMasterIdLst>
   <p:sldIdLst>
     <p:sldId id="256" r:id="rId3"/>
+    <p:sldId id="257" r:id="rId5"/>
   </p:sldIdLst>
   <p:sldSz cx="12192000" cy="6858000"/>
   <p:notesSz cx="7103745" cy="10234295"/>
@@ -110,6 +111,22 @@
       </a:defRPr>
     </a:lvl9pPr>
   </p:defaultTextStyle>
+  <p:extLst>
+    <p:ext uri="{EFAFB233-063F-42B5-8137-9DF3F51BA10A}">
+      <p15:sldGuideLst xmlns:p15="http://schemas.microsoft.com/office/powerpoint/2012/main">
+        <p15:guide id="1" orient="horz" pos="2112" userDrawn="1">
+          <p15:clr>
+            <a:srgbClr val="A4A3A4"/>
+          </p15:clr>
+        </p15:guide>
+        <p15:guide id="2" pos="3840" userDrawn="1">
+          <p15:clr>
+            <a:srgbClr val="A4A3A4"/>
+          </p15:clr>
+        </p15:guide>
+      </p15:sldGuideLst>
+    </p:ext>
+  </p:extLst>
 </p:presentation>
 </file>
 
@@ -3228,7 +3245,7 @@
         <a:spcBef>
           <a:spcPts val="1000"/>
         </a:spcBef>
-        <a:buFont typeface="Arial" panose="020B0604020202020204" pitchFamily="34" charset="0"/>
+        <a:buFont typeface="Arial" panose="020B0604020202090204" pitchFamily="34" charset="0"/>
         <a:buChar char="•"/>
         <a:defRPr sz="2800" kern="1200">
           <a:solidFill>
@@ -3246,7 +3263,7 @@
         <a:spcBef>
           <a:spcPts val="500"/>
         </a:spcBef>
-        <a:buFont typeface="Arial" panose="020B0604020202020204" pitchFamily="34" charset="0"/>
+        <a:buFont typeface="Arial" panose="020B0604020202090204" pitchFamily="34" charset="0"/>
         <a:buChar char="•"/>
         <a:defRPr sz="2400" kern="1200">
           <a:solidFill>
@@ -3264,7 +3281,7 @@
         <a:spcBef>
           <a:spcPts val="500"/>
         </a:spcBef>
-        <a:buFont typeface="Arial" panose="020B0604020202020204" pitchFamily="34" charset="0"/>
+        <a:buFont typeface="Arial" panose="020B0604020202090204" pitchFamily="34" charset="0"/>
         <a:buChar char="•"/>
         <a:defRPr sz="2000" kern="1200">
           <a:solidFill>
@@ -3282,7 +3299,7 @@
         <a:spcBef>
           <a:spcPts val="500"/>
         </a:spcBef>
-        <a:buFont typeface="Arial" panose="020B0604020202020204" pitchFamily="34" charset="0"/>
+        <a:buFont typeface="Arial" panose="020B0604020202090204" pitchFamily="34" charset="0"/>
         <a:buChar char="•"/>
         <a:defRPr sz="1800" kern="1200">
           <a:solidFill>
@@ -3300,7 +3317,7 @@
         <a:spcBef>
           <a:spcPts val="500"/>
         </a:spcBef>
-        <a:buFont typeface="Arial" panose="020B0604020202020204" pitchFamily="34" charset="0"/>
+        <a:buFont typeface="Arial" panose="020B0604020202090204" pitchFamily="34" charset="0"/>
         <a:buChar char="•"/>
         <a:defRPr sz="1800" kern="1200">
           <a:solidFill>
@@ -3318,7 +3335,7 @@
         <a:spcBef>
           <a:spcPts val="500"/>
         </a:spcBef>
-        <a:buFont typeface="Arial" panose="020B0604020202020204" pitchFamily="34" charset="0"/>
+        <a:buFont typeface="Arial" panose="020B0604020202090204" pitchFamily="34" charset="0"/>
         <a:buChar char="•"/>
         <a:defRPr sz="1800" kern="1200">
           <a:solidFill>
@@ -3336,7 +3353,7 @@
         <a:spcBef>
           <a:spcPts val="500"/>
         </a:spcBef>
-        <a:buFont typeface="Arial" panose="020B0604020202020204" pitchFamily="34" charset="0"/>
+        <a:buFont typeface="Arial" panose="020B0604020202090204" pitchFamily="34" charset="0"/>
         <a:buChar char="•"/>
         <a:defRPr sz="1800" kern="1200">
           <a:solidFill>
@@ -3354,7 +3371,7 @@
         <a:spcBef>
           <a:spcPts val="500"/>
         </a:spcBef>
-        <a:buFont typeface="Arial" panose="020B0604020202020204" pitchFamily="34" charset="0"/>
+        <a:buFont typeface="Arial" panose="020B0604020202090204" pitchFamily="34" charset="0"/>
         <a:buChar char="•"/>
         <a:defRPr sz="1800" kern="1200">
           <a:solidFill>
@@ -3372,7 +3389,7 @@
         <a:spcBef>
           <a:spcPts val="500"/>
         </a:spcBef>
-        <a:buFont typeface="Arial" panose="020B0604020202020204" pitchFamily="34" charset="0"/>
+        <a:buFont typeface="Arial" panose="020B0604020202090204" pitchFamily="34" charset="0"/>
         <a:buChar char="•"/>
         <a:defRPr sz="1800" kern="1200">
           <a:solidFill>
@@ -4052,6 +4069,273 @@
           </p:txBody>
         </p:sp>
       </p:grpSp>
+    </p:spTree>
+  </p:cSld>
+  <p:clrMapOvr>
+    <a:masterClrMapping/>
+  </p:clrMapOvr>
+</p:sld>
+</file>
+
+<file path=ppt/slides/slide2.xml><?xml version="1.0" encoding="utf-8"?>
+<p:sld xmlns:a="http://schemas.openxmlformats.org/drawingml/2006/main" xmlns:r="http://schemas.openxmlformats.org/officeDocument/2006/relationships" xmlns:p="http://schemas.openxmlformats.org/presentationml/2006/main">
+  <p:cSld>
+    <p:spTree>
+      <p:nvGrpSpPr>
+        <p:cNvPr id="1" name=""/>
+        <p:cNvGrpSpPr/>
+        <p:nvPr/>
+      </p:nvGrpSpPr>
+      <p:grpSpPr/>
+      <p:sp>
+        <p:nvSpPr>
+          <p:cNvPr id="5" name="矩形 4"/>
+          <p:cNvSpPr/>
+          <p:nvPr/>
+        </p:nvSpPr>
+        <p:spPr>
+          <a:xfrm>
+            <a:off x="3110230" y="1624330"/>
+            <a:ext cx="3463290" cy="3084830"/>
+          </a:xfrm>
+          <a:prstGeom prst="rect">
+            <a:avLst/>
+          </a:prstGeom>
+          <a:solidFill>
+            <a:schemeClr val="bg1"/>
+          </a:solidFill>
+          <a:ln>
+            <a:solidFill>
+              <a:srgbClr val="FF3300"/>
+            </a:solidFill>
+          </a:ln>
+        </p:spPr>
+        <p:style>
+          <a:lnRef idx="2">
+            <a:schemeClr val="accent1">
+              <a:lumMod val="75000"/>
+            </a:schemeClr>
+          </a:lnRef>
+          <a:fillRef idx="1">
+            <a:schemeClr val="accent1"/>
+          </a:fillRef>
+          <a:effectRef idx="0">
+            <a:srgbClr val="FFFFFF"/>
+          </a:effectRef>
+          <a:fontRef idx="minor">
+            <a:schemeClr val="lt1"/>
+          </a:fontRef>
+        </p:style>
+        <p:txBody>
+          <a:bodyPr rtlCol="0" anchor="ctr"/>
+          <a:p>
+            <a:pPr algn="ctr"/>
+            <a:endParaRPr lang="zh-CN" altLang="en-US"/>
+          </a:p>
+        </p:txBody>
+      </p:sp>
+      <p:sp>
+        <p:nvSpPr>
+          <p:cNvPr id="6" name="矩形 5"/>
+          <p:cNvSpPr/>
+          <p:nvPr/>
+        </p:nvSpPr>
+        <p:spPr>
+          <a:xfrm>
+            <a:off x="3941445" y="2266315"/>
+            <a:ext cx="1800000" cy="1800000"/>
+          </a:xfrm>
+          <a:prstGeom prst="rect">
+            <a:avLst/>
+          </a:prstGeom>
+          <a:solidFill>
+            <a:schemeClr val="bg1"/>
+          </a:solidFill>
+          <a:ln>
+            <a:solidFill>
+              <a:schemeClr val="accent4"/>
+            </a:solidFill>
+          </a:ln>
+        </p:spPr>
+        <p:style>
+          <a:lnRef idx="2">
+            <a:schemeClr val="accent1">
+              <a:lumMod val="75000"/>
+            </a:schemeClr>
+          </a:lnRef>
+          <a:fillRef idx="1">
+            <a:schemeClr val="accent1"/>
+          </a:fillRef>
+          <a:effectRef idx="0">
+            <a:srgbClr val="FFFFFF"/>
+          </a:effectRef>
+          <a:fontRef idx="minor">
+            <a:schemeClr val="lt1"/>
+          </a:fontRef>
+        </p:style>
+        <p:txBody>
+          <a:bodyPr rtlCol="0" anchor="ctr"/>
+          <a:p>
+            <a:pPr algn="ctr"/>
+            <a:endParaRPr lang="zh-CN" altLang="en-US"/>
+          </a:p>
+        </p:txBody>
+      </p:sp>
+      <p:sp>
+        <p:nvSpPr>
+          <p:cNvPr id="7" name="椭圆 6"/>
+          <p:cNvSpPr/>
+          <p:nvPr/>
+        </p:nvSpPr>
+        <p:spPr>
+          <a:xfrm>
+            <a:off x="4653915" y="2979420"/>
+            <a:ext cx="374650" cy="374650"/>
+          </a:xfrm>
+          <a:prstGeom prst="ellipse">
+            <a:avLst/>
+          </a:prstGeom>
+        </p:spPr>
+        <p:style>
+          <a:lnRef idx="2">
+            <a:schemeClr val="accent1">
+              <a:lumMod val="75000"/>
+            </a:schemeClr>
+          </a:lnRef>
+          <a:fillRef idx="1">
+            <a:schemeClr val="accent1"/>
+          </a:fillRef>
+          <a:effectRef idx="0">
+            <a:srgbClr val="FFFFFF"/>
+          </a:effectRef>
+          <a:fontRef idx="minor">
+            <a:schemeClr val="lt1"/>
+          </a:fontRef>
+        </p:style>
+        <p:txBody>
+          <a:bodyPr rtlCol="0" anchor="ctr"/>
+          <a:p>
+            <a:pPr algn="ctr"/>
+            <a:endParaRPr lang="zh-CN" altLang="en-US"/>
+          </a:p>
+        </p:txBody>
+      </p:sp>
+      <p:sp>
+        <p:nvSpPr>
+          <p:cNvPr id="8" name="文本框 7"/>
+          <p:cNvSpPr txBox="1"/>
+          <p:nvPr/>
+        </p:nvSpPr>
+        <p:spPr>
+          <a:xfrm>
+            <a:off x="3567430" y="2039620"/>
+            <a:ext cx="546100" cy="306705"/>
+          </a:xfrm>
+          <a:prstGeom prst="rect">
+            <a:avLst/>
+          </a:prstGeom>
+          <a:noFill/>
+        </p:spPr>
+        <p:txBody>
+          <a:bodyPr wrap="square" rtlCol="0">
+            <a:spAutoFit/>
+          </a:bodyPr>
+          <a:p>
+            <a:r>
+              <a:rPr lang="en-US" altLang="zh-CN" sz="1400"/>
+              <a:t>(0,0)</a:t>
+            </a:r>
+            <a:endParaRPr lang="zh-CN" altLang="en-US" sz="1400"/>
+          </a:p>
+        </p:txBody>
+      </p:sp>
+      <p:sp>
+        <p:nvSpPr>
+          <p:cNvPr id="9" name="文本框 8"/>
+          <p:cNvSpPr txBox="1"/>
+          <p:nvPr/>
+        </p:nvSpPr>
+        <p:spPr>
+          <a:xfrm>
+            <a:off x="2265680" y="1317625"/>
+            <a:ext cx="1118870" cy="306705"/>
+          </a:xfrm>
+          <a:prstGeom prst="rect">
+            <a:avLst/>
+          </a:prstGeom>
+          <a:noFill/>
+        </p:spPr>
+        <p:txBody>
+          <a:bodyPr wrap="square" rtlCol="0">
+            <a:spAutoFit/>
+          </a:bodyPr>
+          <a:p>
+            <a:r>
+              <a:rPr lang="en-US" altLang="zh-CN" sz="1400"/>
+              <a:t>(-150,-150)</a:t>
+            </a:r>
+            <a:endParaRPr lang="zh-CN" altLang="en-US" sz="1400"/>
+          </a:p>
+        </p:txBody>
+      </p:sp>
+      <p:sp>
+        <p:nvSpPr>
+          <p:cNvPr id="10" name="文本框 9"/>
+          <p:cNvSpPr txBox="1"/>
+          <p:nvPr/>
+        </p:nvSpPr>
+        <p:spPr>
+          <a:xfrm>
+            <a:off x="5270500" y="2039620"/>
+            <a:ext cx="1118870" cy="306705"/>
+          </a:xfrm>
+          <a:prstGeom prst="rect">
+            <a:avLst/>
+          </a:prstGeom>
+          <a:noFill/>
+        </p:spPr>
+        <p:txBody>
+          <a:bodyPr wrap="square" rtlCol="0">
+            <a:spAutoFit/>
+          </a:bodyPr>
+          <a:p>
+            <a:r>
+              <a:rPr lang="en-US" altLang="zh-CN" sz="1400"/>
+              <a:t>(300,300)</a:t>
+            </a:r>
+            <a:endParaRPr lang="zh-CN" altLang="en-US" sz="1400"/>
+          </a:p>
+        </p:txBody>
+      </p:sp>
+      <p:sp>
+        <p:nvSpPr>
+          <p:cNvPr id="11" name="文本框 10"/>
+          <p:cNvSpPr txBox="1"/>
+          <p:nvPr/>
+        </p:nvSpPr>
+        <p:spPr>
+          <a:xfrm>
+            <a:off x="6697980" y="1317625"/>
+            <a:ext cx="1118870" cy="306705"/>
+          </a:xfrm>
+          <a:prstGeom prst="rect">
+            <a:avLst/>
+          </a:prstGeom>
+          <a:noFill/>
+        </p:spPr>
+        <p:txBody>
+          <a:bodyPr wrap="square" rtlCol="0">
+            <a:spAutoFit/>
+          </a:bodyPr>
+          <a:p>
+            <a:r>
+              <a:rPr lang="en-US" altLang="zh-CN" sz="1400"/>
+              <a:t>(450,450)</a:t>
+            </a:r>
+            <a:endParaRPr lang="zh-CN" altLang="en-US" sz="1400"/>
+          </a:p>
+        </p:txBody>
+      </p:sp>
     </p:spTree>
   </p:cSld>
   <p:clrMapOvr>

</xml_diff>